<commit_message>
Business Knowledge from real-life projects
</commit_message>
<xml_diff>
--- a/Business Knowledge/Customer Relationship Management - CRM.pptx
+++ b/Business Knowledge/Customer Relationship Management - CRM.pptx
@@ -2964,7 +2964,7 @@
         </p:spPr>
         <p:txBody>
           <a:bodyPr>
-            <a:normAutofit fontScale="70000"/>
+            <a:normAutofit fontScale="90000" lnSpcReduction="20000"/>
           </a:bodyPr>
           <a:p>
             <a:pPr marL="0" indent="0">
@@ -2974,10 +2974,14 @@
               <a:buNone/>
             </a:pPr>
             <a:r>
-              <a:rPr lang="en-GB" altLang="en-US"/>
+              <a:rPr lang="en-GB" altLang="en-US" sz="2000"/>
               <a:t>Customer Relationship Management solutions act as a tool for call center agents to answer and serve customer calls more effectively.</a:t>
             </a:r>
-            <a:endParaRPr lang="en-GB" altLang="en-US"/>
+            <a:endParaRPr lang="en-GB" altLang="en-US" sz="2000" b="1">
+              <a:solidFill>
+                <a:srgbClr val="00B050"/>
+              </a:solidFill>
+            </a:endParaRPr>
           </a:p>
           <a:p>
             <a:pPr marL="0" indent="0">
@@ -2986,7 +2990,11 @@
               </a:lnSpc>
               <a:buNone/>
             </a:pPr>
-            <a:endParaRPr lang="en-GB" altLang="en-US"/>
+            <a:endParaRPr lang="en-GB" altLang="en-US" sz="2000" b="1">
+              <a:solidFill>
+                <a:srgbClr val="00B050"/>
+              </a:solidFill>
+            </a:endParaRPr>
           </a:p>
           <a:p>
             <a:pPr marL="0" indent="0">
@@ -2996,129 +3004,7 @@
               <a:buNone/>
             </a:pPr>
             <a:r>
-              <a:rPr lang="en-GB" altLang="en-US"/>
-              <a:t>CRM solutions usually involved functional features of:</a:t>
-            </a:r>
-            <a:endParaRPr lang="en-GB" altLang="en-US"/>
-          </a:p>
-          <a:p>
-            <a:pPr marL="800100" lvl="1" indent="-342900">
-              <a:lnSpc>
-                <a:spcPct val="100000"/>
-              </a:lnSpc>
-            </a:pPr>
-            <a:r>
-              <a:rPr lang="en-GB" altLang="en-US" sz="2400"/>
-              <a:t>Customer Search</a:t>
-            </a:r>
-            <a:endParaRPr lang="en-GB" altLang="en-US" sz="2400"/>
-          </a:p>
-          <a:p>
-            <a:pPr marL="800100" lvl="1" indent="-342900">
-              <a:lnSpc>
-                <a:spcPct val="100000"/>
-              </a:lnSpc>
-            </a:pPr>
-            <a:r>
-              <a:rPr lang="en-GB" altLang="en-US" sz="2400"/>
-              <a:t>View customer details</a:t>
-            </a:r>
-            <a:endParaRPr lang="en-GB" altLang="en-US" sz="2400"/>
-          </a:p>
-          <a:p>
-            <a:pPr marL="800100" lvl="1" indent="-342900">
-              <a:lnSpc>
-                <a:spcPct val="100000"/>
-              </a:lnSpc>
-            </a:pPr>
-            <a:r>
-              <a:rPr lang="en-GB" altLang="en-US" sz="2400"/>
-              <a:t>View any outstanding balance</a:t>
-            </a:r>
-            <a:endParaRPr lang="en-GB" altLang="en-US" sz="2400"/>
-          </a:p>
-          <a:p>
-            <a:pPr marL="800100" lvl="1" indent="-342900">
-              <a:lnSpc>
-                <a:spcPct val="100000"/>
-              </a:lnSpc>
-            </a:pPr>
-            <a:r>
-              <a:rPr lang="en-GB" altLang="en-US"/>
-              <a:t>Collect payment from customer</a:t>
-            </a:r>
-            <a:endParaRPr lang="en-GB" altLang="en-US"/>
-          </a:p>
-          <a:p>
-            <a:pPr marL="800100" lvl="1" indent="-342900">
-              <a:lnSpc>
-                <a:spcPct val="100000"/>
-              </a:lnSpc>
-            </a:pPr>
-            <a:r>
-              <a:rPr lang="en-GB" altLang="en-US"/>
-              <a:t>Log customer complaints to resolve quickly</a:t>
-            </a:r>
-            <a:endParaRPr lang="en-GB" altLang="en-US" b="1">
-              <a:solidFill>
-                <a:srgbClr val="00B050"/>
-              </a:solidFill>
-            </a:endParaRPr>
-          </a:p>
-          <a:p>
-            <a:pPr marL="0" indent="0">
-              <a:lnSpc>
-                <a:spcPct val="100000"/>
-              </a:lnSpc>
-              <a:buNone/>
-            </a:pPr>
-            <a:endParaRPr lang="en-GB" altLang="en-US"/>
-          </a:p>
-          <a:p>
-            <a:pPr marL="0" indent="0">
-              <a:lnSpc>
-                <a:spcPct val="100000"/>
-              </a:lnSpc>
-              <a:buNone/>
-            </a:pPr>
-            <a:r>
-              <a:rPr lang="en-GB" altLang="en-US"/>
-              <a:t>CRM solutions would mean a quick resolution to customer's queries and </a:t>
-            </a:r>
-            <a:r>
-              <a:rPr lang="en-GB" altLang="en-US">
-                <a:sym typeface="+mn-ea"/>
-              </a:rPr>
-              <a:t>reduce paper correspondences too.</a:t>
-            </a:r>
-            <a:endParaRPr lang="en-GB" altLang="en-US" b="1">
-              <a:solidFill>
-                <a:srgbClr val="00B050"/>
-              </a:solidFill>
-            </a:endParaRPr>
-          </a:p>
-          <a:p>
-            <a:pPr marL="0" indent="0">
-              <a:lnSpc>
-                <a:spcPct val="100000"/>
-              </a:lnSpc>
-              <a:buNone/>
-            </a:pPr>
-            <a:endParaRPr lang="en-GB" altLang="en-US" b="1">
-              <a:solidFill>
-                <a:srgbClr val="00B050"/>
-              </a:solidFill>
-            </a:endParaRPr>
-          </a:p>
-          <a:p>
-            <a:pPr marL="0" indent="0">
-              <a:lnSpc>
-                <a:spcPct val="100000"/>
-              </a:lnSpc>
-              <a:buNone/>
-            </a:pPr>
-            <a:r>
-              <a:rPr lang="en-GB" altLang="en-US" b="1">
+              <a:rPr lang="en-GB" altLang="en-US" sz="2000" b="1">
                 <a:solidFill>
                   <a:srgbClr val="00B050"/>
                 </a:solidFill>
@@ -3126,10 +3012,182 @@
               <a:t>Clients worked for:</a:t>
             </a:r>
             <a:r>
-              <a:rPr lang="en-GB" altLang="en-US"/>
+              <a:rPr lang="en-GB" altLang="en-US" sz="2000"/>
               <a:t> BSkyB (Media) &amp; Admin Re (Insurance)</a:t>
             </a:r>
-            <a:endParaRPr lang="en-GB" altLang="en-US"/>
+            <a:endParaRPr lang="en-GB" altLang="en-US" sz="2000"/>
+          </a:p>
+          <a:p>
+            <a:pPr marL="0" indent="0">
+              <a:lnSpc>
+                <a:spcPct val="100000"/>
+              </a:lnSpc>
+              <a:buNone/>
+            </a:pPr>
+            <a:endParaRPr lang="en-GB" altLang="en-US" sz="2000"/>
+          </a:p>
+          <a:p>
+            <a:pPr marL="0" indent="0">
+              <a:lnSpc>
+                <a:spcPct val="100000"/>
+              </a:lnSpc>
+              <a:buNone/>
+            </a:pPr>
+            <a:r>
+              <a:rPr lang="en-GB" altLang="en-US" sz="2000"/>
+              <a:t>BSkyB CRM for business customers involved building functional features of:</a:t>
+            </a:r>
+            <a:endParaRPr lang="en-GB" altLang="en-US" sz="2000"/>
+          </a:p>
+          <a:p>
+            <a:pPr marL="457200" indent="-457200">
+              <a:lnSpc>
+                <a:spcPct val="100000"/>
+              </a:lnSpc>
+              <a:buAutoNum type="arabicPeriod"/>
+            </a:pPr>
+            <a:r>
+              <a:rPr lang="en-GB" altLang="en-US" sz="2000">
+                <a:sym typeface="+mn-ea"/>
+              </a:rPr>
+              <a:t>Customer Search, </a:t>
+            </a:r>
+            <a:endParaRPr lang="en-GB" altLang="en-US" sz="2000">
+              <a:sym typeface="+mn-ea"/>
+            </a:endParaRPr>
+          </a:p>
+          <a:p>
+            <a:pPr marL="457200" indent="-457200">
+              <a:lnSpc>
+                <a:spcPct val="100000"/>
+              </a:lnSpc>
+              <a:buAutoNum type="arabicPeriod"/>
+            </a:pPr>
+            <a:r>
+              <a:rPr lang="en-GB" altLang="en-US" sz="2000">
+                <a:sym typeface="+mn-ea"/>
+              </a:rPr>
+              <a:t>View customer details, </a:t>
+            </a:r>
+            <a:endParaRPr lang="en-GB" altLang="en-US" sz="2000">
+              <a:sym typeface="+mn-ea"/>
+            </a:endParaRPr>
+          </a:p>
+          <a:p>
+            <a:pPr marL="457200" indent="-457200">
+              <a:lnSpc>
+                <a:spcPct val="100000"/>
+              </a:lnSpc>
+              <a:buAutoNum type="arabicPeriod"/>
+            </a:pPr>
+            <a:r>
+              <a:rPr lang="en-GB" altLang="en-US" sz="2000">
+                <a:sym typeface="+mn-ea"/>
+              </a:rPr>
+              <a:t>View any outstanding balance, </a:t>
+            </a:r>
+            <a:endParaRPr lang="en-GB" altLang="en-US" sz="2000">
+              <a:sym typeface="+mn-ea"/>
+            </a:endParaRPr>
+          </a:p>
+          <a:p>
+            <a:pPr marL="457200" indent="-457200">
+              <a:lnSpc>
+                <a:spcPct val="100000"/>
+              </a:lnSpc>
+              <a:buAutoNum type="arabicPeriod"/>
+            </a:pPr>
+            <a:r>
+              <a:rPr lang="en-GB" altLang="en-US" sz="2000">
+                <a:sym typeface="+mn-ea"/>
+              </a:rPr>
+              <a:t>Collect payment from customer, </a:t>
+            </a:r>
+            <a:endParaRPr lang="en-GB" altLang="en-US" sz="2000">
+              <a:sym typeface="+mn-ea"/>
+            </a:endParaRPr>
+          </a:p>
+          <a:p>
+            <a:pPr marL="457200" indent="-457200">
+              <a:lnSpc>
+                <a:spcPct val="100000"/>
+              </a:lnSpc>
+              <a:buAutoNum type="arabicPeriod"/>
+            </a:pPr>
+            <a:r>
+              <a:rPr lang="en-GB" altLang="en-US" sz="2000">
+                <a:sym typeface="+mn-ea"/>
+              </a:rPr>
+              <a:t>Compliance &amp; </a:t>
+            </a:r>
+            <a:endParaRPr lang="en-GB" altLang="en-US" sz="2000">
+              <a:sym typeface="+mn-ea"/>
+            </a:endParaRPr>
+          </a:p>
+          <a:p>
+            <a:pPr marL="457200" indent="-457200">
+              <a:lnSpc>
+                <a:spcPct val="100000"/>
+              </a:lnSpc>
+              <a:buAutoNum type="arabicPeriod"/>
+            </a:pPr>
+            <a:r>
+              <a:rPr lang="en-GB" altLang="en-US" sz="2000">
+                <a:sym typeface="+mn-ea"/>
+              </a:rPr>
+              <a:t>Inbound/Outbound correspondences.</a:t>
+            </a:r>
+            <a:endParaRPr lang="en-GB" altLang="en-US" sz="2000">
+              <a:sym typeface="+mn-ea"/>
+            </a:endParaRPr>
+          </a:p>
+          <a:p>
+            <a:pPr marL="0" indent="0">
+              <a:lnSpc>
+                <a:spcPct val="100000"/>
+              </a:lnSpc>
+              <a:buNone/>
+            </a:pPr>
+            <a:endParaRPr lang="en-GB" altLang="en-US" sz="2000"/>
+          </a:p>
+          <a:p>
+            <a:pPr marL="0" lvl="0" indent="0">
+              <a:lnSpc>
+                <a:spcPct val="100000"/>
+              </a:lnSpc>
+              <a:buNone/>
+            </a:pPr>
+            <a:r>
+              <a:rPr lang="en-GB" altLang="en-US" sz="2000"/>
+              <a:t>Admin Re CRM for Independent Financial advisors involved building functional features of:</a:t>
+            </a:r>
+            <a:endParaRPr lang="en-GB" altLang="en-US" sz="2000"/>
+          </a:p>
+          <a:p>
+            <a:pPr marL="342900" lvl="0" indent="-342900">
+              <a:lnSpc>
+                <a:spcPct val="100000"/>
+              </a:lnSpc>
+              <a:buAutoNum type="arabicPeriod"/>
+            </a:pPr>
+            <a:r>
+              <a:rPr lang="en-GB" altLang="en-US" sz="2000"/>
+              <a:t>searching customers insurance claims and </a:t>
+            </a:r>
+            <a:endParaRPr lang="en-GB" altLang="en-US" sz="2000"/>
+          </a:p>
+          <a:p>
+            <a:pPr marL="342900" lvl="0" indent="-342900">
+              <a:lnSpc>
+                <a:spcPct val="100000"/>
+              </a:lnSpc>
+              <a:buAutoNum type="arabicPeriod"/>
+            </a:pPr>
+            <a:r>
+              <a:rPr lang="en-GB" altLang="en-US" sz="2000"/>
+              <a:t>viewing insurance claims</a:t>
+            </a:r>
+            <a:endParaRPr lang="en-GB" altLang="en-US" sz="2000"/>
           </a:p>
         </p:txBody>
       </p:sp>

</xml_diff>